<commit_message>
upgrading knockout and adding a foreach binding
</commit_message>
<xml_diff>
--- a/JavaScript using an API with Knockout.pptx
+++ b/JavaScript using an API with Knockout.pptx
@@ -403,7 +403,7 @@
           <a:p>
             <a:fld id="{2F9D743F-7C85-4EEC-9C4E-400124DFB0D8}" type="datetimeFigureOut">
               <a:rPr lang="en-US" smtClean="0"/>
-              <a:t>1/23/2012</a:t>
+              <a:t>1/24/2012</a:t>
             </a:fld>
             <a:endParaRPr lang="en-US"/>
           </a:p>
@@ -568,7 +568,7 @@
           <a:p>
             <a:fld id="{2F9D743F-7C85-4EEC-9C4E-400124DFB0D8}" type="datetimeFigureOut">
               <a:rPr lang="en-US" smtClean="0"/>
-              <a:t>1/23/2012</a:t>
+              <a:t>1/24/2012</a:t>
             </a:fld>
             <a:endParaRPr lang="en-US"/>
           </a:p>
@@ -743,7 +743,7 @@
           <a:p>
             <a:fld id="{2F9D743F-7C85-4EEC-9C4E-400124DFB0D8}" type="datetimeFigureOut">
               <a:rPr lang="en-US" smtClean="0"/>
-              <a:t>1/23/2012</a:t>
+              <a:t>1/24/2012</a:t>
             </a:fld>
             <a:endParaRPr lang="en-US"/>
           </a:p>
@@ -890,7 +890,7 @@
           <a:p>
             <a:fld id="{2F9D743F-7C85-4EEC-9C4E-400124DFB0D8}" type="datetimeFigureOut">
               <a:rPr lang="en-US" smtClean="0"/>
-              <a:t>1/23/2012</a:t>
+              <a:t>1/24/2012</a:t>
             </a:fld>
             <a:endParaRPr lang="en-US"/>
           </a:p>
@@ -1007,7 +1007,7 @@
           <a:p>
             <a:fld id="{2F9D743F-7C85-4EEC-9C4E-400124DFB0D8}" type="datetimeFigureOut">
               <a:rPr lang="en-US" smtClean="0"/>
-              <a:t>1/23/2012</a:t>
+              <a:t>1/24/2012</a:t>
             </a:fld>
             <a:endParaRPr lang="en-US"/>
           </a:p>
@@ -1277,7 +1277,7 @@
           <a:p>
             <a:fld id="{2F9D743F-7C85-4EEC-9C4E-400124DFB0D8}" type="datetimeFigureOut">
               <a:rPr lang="en-US" smtClean="0"/>
-              <a:t>1/23/2012</a:t>
+              <a:t>1/24/2012</a:t>
             </a:fld>
             <a:endParaRPr lang="en-US"/>
           </a:p>
@@ -1546,7 +1546,7 @@
           <a:p>
             <a:fld id="{2F9D743F-7C85-4EEC-9C4E-400124DFB0D8}" type="datetimeFigureOut">
               <a:rPr lang="en-US" smtClean="0"/>
-              <a:t>1/23/2012</a:t>
+              <a:t>1/24/2012</a:t>
             </a:fld>
             <a:endParaRPr lang="en-US"/>
           </a:p>
@@ -1993,7 +1993,7 @@
           <a:p>
             <a:fld id="{2F9D743F-7C85-4EEC-9C4E-400124DFB0D8}" type="datetimeFigureOut">
               <a:rPr lang="en-US" smtClean="0"/>
-              <a:t>1/23/2012</a:t>
+              <a:t>1/24/2012</a:t>
             </a:fld>
             <a:endParaRPr lang="en-US"/>
           </a:p>
@@ -2106,7 +2106,7 @@
           <a:p>
             <a:fld id="{2F9D743F-7C85-4EEC-9C4E-400124DFB0D8}" type="datetimeFigureOut">
               <a:rPr lang="en-US" smtClean="0"/>
-              <a:t>1/23/2012</a:t>
+              <a:t>1/24/2012</a:t>
             </a:fld>
             <a:endParaRPr lang="en-US"/>
           </a:p>
@@ -2356,7 +2356,7 @@
           <a:p>
             <a:fld id="{2F9D743F-7C85-4EEC-9C4E-400124DFB0D8}" type="datetimeFigureOut">
               <a:rPr lang="en-US" smtClean="0"/>
-              <a:t>1/23/2012</a:t>
+              <a:t>1/24/2012</a:t>
             </a:fld>
             <a:endParaRPr lang="en-US"/>
           </a:p>
@@ -2596,7 +2596,7 @@
           <a:p>
             <a:fld id="{2F9D743F-7C85-4EEC-9C4E-400124DFB0D8}" type="datetimeFigureOut">
               <a:rPr lang="en-US" smtClean="0"/>
-              <a:t>1/23/2012</a:t>
+              <a:t>1/24/2012</a:t>
             </a:fld>
             <a:endParaRPr lang="en-US"/>
           </a:p>
@@ -2769,7 +2769,7 @@
           <a:p>
             <a:fld id="{2F9D743F-7C85-4EEC-9C4E-400124DFB0D8}" type="datetimeFigureOut">
               <a:rPr lang="en-US" smtClean="0"/>
-              <a:t>1/23/2012</a:t>
+              <a:t>1/24/2012</a:t>
             </a:fld>
             <a:endParaRPr lang="en-US"/>
           </a:p>
@@ -3560,13 +3560,7 @@
               <a:rPr lang="en-US" baseline="0" dirty="0" smtClean="0">
                 <a:hlinkClick r:id="rId3"/>
               </a:rPr>
-              <a:t>Checked </a:t>
-            </a:r>
-            <a:r>
-              <a:rPr lang="en-US" baseline="0" dirty="0" smtClean="0">
-                <a:hlinkClick r:id="rId3"/>
-              </a:rPr>
-              <a:t>Binding</a:t>
+              <a:t>Checked Binding</a:t>
             </a:r>
             <a:endParaRPr lang="en-US" baseline="0" dirty="0" smtClean="0"/>
           </a:p>
@@ -3576,7 +3570,23 @@
               <a:rPr lang="en-US" dirty="0" smtClean="0">
                 <a:hlinkClick r:id="rId4"/>
               </a:rPr>
-              <a:t>Visible Binding</a:t>
+              <a:t>Visible </a:t>
+            </a:r>
+            <a:r>
+              <a:rPr lang="en-US" dirty="0" smtClean="0">
+                <a:hlinkClick r:id="rId4"/>
+              </a:rPr>
+              <a:t>Binding</a:t>
+            </a:r>
+            <a:endParaRPr lang="en-US" dirty="0" smtClean="0"/>
+          </a:p>
+          <a:p>
+            <a:pPr lvl="1"/>
+            <a:r>
+              <a:rPr lang="en-US" baseline="0" dirty="0" smtClean="0">
+                <a:hlinkClick r:id="rId5"/>
+              </a:rPr>
+              <a:t>For Each Binding</a:t>
             </a:r>
             <a:endParaRPr lang="en-US" baseline="0" dirty="0" smtClean="0"/>
           </a:p>

</xml_diff>